<commit_message>
Final Commit for Day 12
</commit_message>
<xml_diff>
--- a/powerpoints/Roc_Day12 - Logging_Lambdas.pptx
+++ b/powerpoints/Roc_Day12 - Logging_Lambdas.pptx
@@ -25495,7 +25495,7 @@
         </p:spPr>
         <p:txBody>
           <a:bodyPr>
-            <a:normAutofit fontScale="62500" lnSpcReduction="20000"/>
+            <a:normAutofit fontScale="70000" lnSpcReduction="20000"/>
           </a:bodyPr>
           <a:lstStyle/>
           <a:p>
@@ -25537,7 +25537,7 @@
             </a:r>
             <a:r>
               <a:rPr lang="en-US" dirty="0"/>
-              <a:t> – name of location for where file will be written. Should reflect your project settings i.e. your maven group-id</a:t>
+              <a:t> – package location for logger</a:t>
             </a:r>
           </a:p>
           <a:p>
@@ -25548,7 +25548,7 @@
             </a:r>
             <a:r>
               <a:rPr lang="en-US" dirty="0"/>
-              <a:t> – the logging level. </a:t>
+              <a:t> – the logging level.</a:t>
             </a:r>
           </a:p>
           <a:p>

</xml_diff>

<commit_message>
updating day 12 powerpoint
</commit_message>
<xml_diff>
--- a/powerpoints/Roc_Day12 - Logging_Lambdas.pptx
+++ b/powerpoints/Roc_Day12 - Logging_Lambdas.pptx
@@ -25425,7 +25425,28 @@
                 <a:latin typeface="+mj-lt"/>
                 <a:cs typeface="Courier New" panose="02070309020205020404" pitchFamily="49" charset="0"/>
               </a:rPr>
-              <a:t>logger.file.name</a:t>
+              <a:t>loggers = </a:t>
+            </a:r>
+            <a:r>
+              <a:rPr lang="en-US" sz="2000" b="1" dirty="0" err="1">
+                <a:latin typeface="+mj-lt"/>
+                <a:cs typeface="Courier New" panose="02070309020205020404" pitchFamily="49" charset="0"/>
+              </a:rPr>
+              <a:t>dao</a:t>
+            </a:r>
+            <a:endParaRPr lang="en-US" sz="2000" b="1" dirty="0">
+              <a:latin typeface="+mj-lt"/>
+              <a:cs typeface="Courier New" panose="02070309020205020404" pitchFamily="49" charset="0"/>
+            </a:endParaRPr>
+          </a:p>
+          <a:p>
+            <a:pPr defTabSz="228600"/>
+            <a:r>
+              <a:rPr lang="en-US" sz="2000" b="1" dirty="0">
+                <a:latin typeface="+mj-lt"/>
+                <a:cs typeface="Courier New" panose="02070309020205020404" pitchFamily="49" charset="0"/>
+              </a:rPr>
+              <a:t>logger.dao.name</a:t>
             </a:r>
             <a:r>
               <a:rPr lang="en-US" sz="2000" dirty="0">
@@ -25438,11 +25459,11 @@
           <a:p>
             <a:pPr defTabSz="228600"/>
             <a:r>
-              <a:rPr lang="en-US" sz="2000" b="1" dirty="0">
+              <a:rPr lang="en-US" sz="2000" b="1" dirty="0" err="1">
                 <a:latin typeface="+mj-lt"/>
                 <a:cs typeface="Courier New" panose="02070309020205020404" pitchFamily="49" charset="0"/>
               </a:rPr>
-              <a:t>logger.file.level</a:t>
+              <a:t>logger.dao.level</a:t>
             </a:r>
             <a:r>
               <a:rPr lang="en-US" sz="2000" dirty="0">
@@ -25455,11 +25476,11 @@
           <a:p>
             <a:pPr defTabSz="228600"/>
             <a:r>
-              <a:rPr lang="en-US" sz="2000" b="1" dirty="0">
+              <a:rPr lang="en-US" sz="2000" b="1" dirty="0" err="1">
                 <a:latin typeface="+mj-lt"/>
                 <a:cs typeface="Courier New" panose="02070309020205020404" pitchFamily="49" charset="0"/>
               </a:rPr>
-              <a:t>logger.file.appenderRef.file.ref</a:t>
+              <a:t>logger.dao.appenderRef.file.ref</a:t>
             </a:r>
             <a:r>
               <a:rPr lang="en-US" sz="2000" dirty="0">
@@ -25495,7 +25516,7 @@
         </p:spPr>
         <p:txBody>
           <a:bodyPr>
-            <a:normAutofit fontScale="70000" lnSpcReduction="20000"/>
+            <a:normAutofit fontScale="62500" lnSpcReduction="20000"/>
           </a:bodyPr>
           <a:lstStyle/>
           <a:p>
@@ -25522,6 +25543,16 @@
           <a:p>
             <a:r>
               <a:rPr lang="en-US" b="1" dirty="0"/>
+              <a:t>loggers</a:t>
+            </a:r>
+            <a:r>
+              <a:rPr lang="en-US" dirty="0"/>
+              <a:t> – named list of loggers for which configurations will be defined</a:t>
+            </a:r>
+          </a:p>
+          <a:p>
+            <a:r>
+              <a:rPr lang="en-US" b="1" dirty="0"/>
               <a:t>logger</a:t>
             </a:r>
             <a:r>
@@ -25537,7 +25568,7 @@
             </a:r>
             <a:r>
               <a:rPr lang="en-US" dirty="0"/>
-              <a:t> – package location for logger</a:t>
+              <a:t> – package location for named logger</a:t>
             </a:r>
           </a:p>
           <a:p>
@@ -29679,24 +29710,56 @@
                 <a:latin typeface="+mj-lt"/>
                 <a:cs typeface="Courier New" panose="02070309020205020404" pitchFamily="49" charset="0"/>
               </a:rPr>
-              <a:t>logger.file.name</a:t>
+              <a:t>loggers = </a:t>
+            </a:r>
+            <a:r>
+              <a:rPr lang="en-US" sz="2000" b="1" dirty="0" err="1">
+                <a:latin typeface="+mj-lt"/>
+                <a:cs typeface="Courier New" panose="02070309020205020404" pitchFamily="49" charset="0"/>
+              </a:rPr>
+              <a:t>dao</a:t>
+            </a:r>
+            <a:endParaRPr lang="en-US" sz="2000" b="1" dirty="0">
+              <a:latin typeface="+mj-lt"/>
+              <a:cs typeface="Courier New" panose="02070309020205020404" pitchFamily="49" charset="0"/>
+            </a:endParaRPr>
+          </a:p>
+          <a:p>
+            <a:pPr defTabSz="228600"/>
+            <a:r>
+              <a:rPr lang="en-US" sz="2000" b="1" dirty="0">
+                <a:latin typeface="+mj-lt"/>
+                <a:cs typeface="Courier New" panose="02070309020205020404" pitchFamily="49" charset="0"/>
+              </a:rPr>
+              <a:t>logger.dao.name</a:t>
             </a:r>
             <a:r>
               <a:rPr lang="en-US" sz="2000" dirty="0">
                 <a:latin typeface="+mj-lt"/>
                 <a:cs typeface="Courier New" panose="02070309020205020404" pitchFamily="49" charset="0"/>
               </a:rPr>
-              <a:t> = com.revature</a:t>
-            </a:r>
+              <a:t> = </a:t>
+            </a:r>
+            <a:r>
+              <a:rPr lang="en-US" sz="2000" dirty="0" err="1">
+                <a:latin typeface="+mj-lt"/>
+                <a:cs typeface="Courier New" panose="02070309020205020404" pitchFamily="49" charset="0"/>
+              </a:rPr>
+              <a:t>dao</a:t>
+            </a:r>
+            <a:endParaRPr lang="en-US" sz="2000" dirty="0">
+              <a:latin typeface="+mj-lt"/>
+              <a:cs typeface="Courier New" panose="02070309020205020404" pitchFamily="49" charset="0"/>
+            </a:endParaRPr>
           </a:p>
           <a:p>
             <a:pPr defTabSz="228600"/>
             <a:r>
-              <a:rPr lang="en-US" sz="2000" b="1" dirty="0">
+              <a:rPr lang="en-US" sz="2000" b="1" dirty="0" err="1">
                 <a:latin typeface="+mj-lt"/>
                 <a:cs typeface="Courier New" panose="02070309020205020404" pitchFamily="49" charset="0"/>
               </a:rPr>
-              <a:t>logger.file.level</a:t>
+              <a:t>logger.dao.level</a:t>
             </a:r>
             <a:r>
               <a:rPr lang="en-US" sz="2000" dirty="0">
@@ -29709,11 +29772,11 @@
           <a:p>
             <a:pPr defTabSz="228600"/>
             <a:r>
-              <a:rPr lang="en-US" sz="2000" b="1" dirty="0">
+              <a:rPr lang="en-US" sz="2000" b="1" dirty="0" err="1">
                 <a:latin typeface="+mj-lt"/>
                 <a:cs typeface="Courier New" panose="02070309020205020404" pitchFamily="49" charset="0"/>
               </a:rPr>
-              <a:t>logger.file.appenderRef.file.ref</a:t>
+              <a:t>logger.dao.appenderRef.file.ref</a:t>
             </a:r>
             <a:r>
               <a:rPr lang="en-US" sz="2000" dirty="0">

</xml_diff>

<commit_message>
Adding Project Files to Repository for Bonus Lecture
</commit_message>
<xml_diff>
--- a/powerpoints/Roc_Day12 - Logging_Lambdas.pptx
+++ b/powerpoints/Roc_Day12 - Logging_Lambdas.pptx
@@ -25453,8 +25453,19 @@
                 <a:latin typeface="+mj-lt"/>
                 <a:cs typeface="Courier New" panose="02070309020205020404" pitchFamily="49" charset="0"/>
               </a:rPr>
-              <a:t> = com.revature</a:t>
-            </a:r>
+              <a:t> = </a:t>
+            </a:r>
+            <a:r>
+              <a:rPr lang="en-US" sz="2000" dirty="0" err="1">
+                <a:latin typeface="+mj-lt"/>
+                <a:cs typeface="Courier New" panose="02070309020205020404" pitchFamily="49" charset="0"/>
+              </a:rPr>
+              <a:t>com.revature.dao</a:t>
+            </a:r>
+            <a:endParaRPr lang="en-US" sz="2000" dirty="0">
+              <a:latin typeface="+mj-lt"/>
+              <a:cs typeface="Courier New" panose="02070309020205020404" pitchFamily="49" charset="0"/>
+            </a:endParaRPr>
           </a:p>
           <a:p>
             <a:pPr defTabSz="228600"/>
@@ -29745,7 +29756,7 @@
                 <a:latin typeface="+mj-lt"/>
                 <a:cs typeface="Courier New" panose="02070309020205020404" pitchFamily="49" charset="0"/>
               </a:rPr>
-              <a:t>dao</a:t>
+              <a:t>com.revature.dao</a:t>
             </a:r>
             <a:endParaRPr lang="en-US" sz="2000" dirty="0">
               <a:latin typeface="+mj-lt"/>

</xml_diff>